<commit_message>
update week 1 slides
</commit_message>
<xml_diff>
--- a/Week-01-Software-Engineering/Slides/Week 01 Software Engineering.pptx
+++ b/Week-01-Software-Engineering/Slides/Week 01 Software Engineering.pptx
@@ -5,7 +5,7 @@
     <p:sldMasterId id="2147483648" r:id="rId1"/>
   </p:sldMasterIdLst>
   <p:notesMasterIdLst>
-    <p:notesMasterId r:id="rId43"/>
+    <p:notesMasterId r:id="rId42"/>
   </p:notesMasterIdLst>
   <p:sldIdLst>
     <p:sldId id="256" r:id="rId2"/>
@@ -48,7 +48,6 @@
     <p:sldId id="294" r:id="rId39"/>
     <p:sldId id="299" r:id="rId40"/>
     <p:sldId id="300" r:id="rId41"/>
-    <p:sldId id="303" r:id="rId42"/>
   </p:sldIdLst>
   <p:sldSz cx="12192000" cy="6858000"/>
   <p:notesSz cx="6858000" cy="9144000"/>
@@ -25705,7 +25704,7 @@
           <a:p>
             <a:fld id="{9EED3F63-9CC3-4C63-884F-D7B1F428E7FA}" type="datetimeFigureOut">
               <a:rPr lang="th-TH" smtClean="0"/>
-              <a:t>08/08/62</a:t>
+              <a:t>10/08/62</a:t>
             </a:fld>
             <a:endParaRPr lang="th-TH"/>
           </a:p>
@@ -26126,7 +26125,7 @@
           <a:p>
             <a:fld id="{F1DFDF29-65A8-47EA-AFAE-D8DC6BE9EBE4}" type="datetime1">
               <a:rPr lang="th-TH" smtClean="0"/>
-              <a:t>08/08/62</a:t>
+              <a:t>10/08/62</a:t>
             </a:fld>
             <a:endParaRPr lang="th-TH"/>
           </a:p>
@@ -26354,7 +26353,7 @@
           <a:p>
             <a:fld id="{C4059FAB-3BD3-4EDF-A80A-E3999FB533D7}" type="datetime1">
               <a:rPr lang="th-TH" smtClean="0"/>
-              <a:t>08/08/62</a:t>
+              <a:t>10/08/62</a:t>
             </a:fld>
             <a:endParaRPr lang="th-TH"/>
           </a:p>
@@ -26592,7 +26591,7 @@
           <a:p>
             <a:fld id="{65823DC6-E5EA-4209-878D-ADBA9C2EC690}" type="datetime1">
               <a:rPr lang="th-TH" smtClean="0"/>
-              <a:t>08/08/62</a:t>
+              <a:t>10/08/62</a:t>
             </a:fld>
             <a:endParaRPr lang="th-TH"/>
           </a:p>
@@ -26820,7 +26819,7 @@
           <a:p>
             <a:fld id="{B7CCCE80-310B-4644-9FBE-BA97050A19C5}" type="datetime1">
               <a:rPr lang="th-TH" smtClean="0"/>
-              <a:t>08/08/62</a:t>
+              <a:t>10/08/62</a:t>
             </a:fld>
             <a:endParaRPr lang="th-TH"/>
           </a:p>
@@ -27130,7 +27129,7 @@
           <a:p>
             <a:fld id="{DBFCDF09-C0ED-4C62-864C-746A3A213D64}" type="datetime1">
               <a:rPr lang="th-TH" smtClean="0"/>
-              <a:t>08/08/62</a:t>
+              <a:t>10/08/62</a:t>
             </a:fld>
             <a:endParaRPr lang="th-TH"/>
           </a:p>
@@ -27425,7 +27424,7 @@
           <a:p>
             <a:fld id="{C32E9216-54DD-4655-B294-8D3E58ACD1EB}" type="datetime1">
               <a:rPr lang="th-TH" smtClean="0"/>
-              <a:t>08/08/62</a:t>
+              <a:t>10/08/62</a:t>
             </a:fld>
             <a:endParaRPr lang="th-TH"/>
           </a:p>
@@ -27867,7 +27866,7 @@
           <a:p>
             <a:fld id="{DC1B1CCD-EDF3-4E9E-921D-0C14E85E1A61}" type="datetime1">
               <a:rPr lang="th-TH" smtClean="0"/>
-              <a:t>08/08/62</a:t>
+              <a:t>10/08/62</a:t>
             </a:fld>
             <a:endParaRPr lang="th-TH"/>
           </a:p>
@@ -28038,7 +28037,7 @@
           <a:p>
             <a:fld id="{662928D6-51A3-4D31-8FBD-014C35A82645}" type="datetime1">
               <a:rPr lang="th-TH" smtClean="0"/>
-              <a:t>08/08/62</a:t>
+              <a:t>10/08/62</a:t>
             </a:fld>
             <a:endParaRPr lang="th-TH"/>
           </a:p>
@@ -28181,7 +28180,7 @@
           <a:p>
             <a:fld id="{BB9B6965-6920-4391-844C-BF7D6577B661}" type="datetime1">
               <a:rPr lang="th-TH" smtClean="0"/>
-              <a:t>08/08/62</a:t>
+              <a:t>10/08/62</a:t>
             </a:fld>
             <a:endParaRPr lang="th-TH"/>
           </a:p>
@@ -28522,7 +28521,7 @@
           <a:p>
             <a:fld id="{8872A2DC-C4AD-4315-AA21-82EC6726988D}" type="datetime1">
               <a:rPr lang="th-TH" smtClean="0"/>
-              <a:t>08/08/62</a:t>
+              <a:t>10/08/62</a:t>
             </a:fld>
             <a:endParaRPr lang="th-TH"/>
           </a:p>
@@ -28840,7 +28839,7 @@
           <a:p>
             <a:fld id="{9ADBC62A-0E1F-4532-9537-243E4FFC2FD6}" type="datetime1">
               <a:rPr lang="th-TH" smtClean="0"/>
-              <a:t>08/08/62</a:t>
+              <a:t>10/08/62</a:t>
             </a:fld>
             <a:endParaRPr lang="th-TH"/>
           </a:p>
@@ -29104,7 +29103,7 @@
           <a:p>
             <a:fld id="{F6A530D5-3762-47B5-BDCE-03F0B33A7F91}" type="datetime1">
               <a:rPr lang="th-TH" smtClean="0"/>
-              <a:t>08/08/62</a:t>
+              <a:t>10/08/62</a:t>
             </a:fld>
             <a:endParaRPr lang="th-TH"/>
           </a:p>
@@ -39044,181 +39043,6 @@
     <p:extLst>
       <p:ext uri="{BB962C8B-B14F-4D97-AF65-F5344CB8AC3E}">
         <p14:creationId xmlns:p14="http://schemas.microsoft.com/office/powerpoint/2010/main" val="4143079056"/>
-      </p:ext>
-    </p:extLst>
-  </p:cSld>
-  <p:clrMapOvr>
-    <a:masterClrMapping/>
-  </p:clrMapOvr>
-</p:sld>
-</file>
-
-<file path=ppt/slides/slide41.xml><?xml version="1.0" encoding="utf-8"?>
-<p:sld xmlns:a="http://schemas.openxmlformats.org/drawingml/2006/main" xmlns:r="http://schemas.openxmlformats.org/officeDocument/2006/relationships" xmlns:p="http://schemas.openxmlformats.org/presentationml/2006/main">
-  <p:cSld>
-    <p:spTree>
-      <p:nvGrpSpPr>
-        <p:cNvPr id="1" name=""/>
-        <p:cNvGrpSpPr/>
-        <p:nvPr/>
-      </p:nvGrpSpPr>
-      <p:grpSpPr>
-        <a:xfrm>
-          <a:off x="0" y="0"/>
-          <a:ext cx="0" cy="0"/>
-          <a:chOff x="0" y="0"/>
-          <a:chExt cx="0" cy="0"/>
-        </a:xfrm>
-      </p:grpSpPr>
-      <p:sp>
-        <p:nvSpPr>
-          <p:cNvPr id="2" name="ชื่อเรื่อง 1">
-            <a:extLst>
-              <a:ext uri="{FF2B5EF4-FFF2-40B4-BE49-F238E27FC236}">
-                <a16:creationId xmlns:a16="http://schemas.microsoft.com/office/drawing/2014/main" id="{36D8DFDE-23CF-41EE-8D79-D75351B47629}"/>
-              </a:ext>
-            </a:extLst>
-          </p:cNvPr>
-          <p:cNvSpPr>
-            <a:spLocks noGrp="1"/>
-          </p:cNvSpPr>
-          <p:nvPr>
-            <p:ph type="title"/>
-          </p:nvPr>
-        </p:nvSpPr>
-        <p:spPr/>
-        <p:txBody>
-          <a:bodyPr/>
-          <a:lstStyle/>
-          <a:p>
-            <a:r>
-              <a:rPr lang="th-TH" b="1" dirty="0">
-                <a:solidFill>
-                  <a:srgbClr val="0070C0"/>
-                </a:solidFill>
-                <a:effectLst>
-                  <a:outerShdw blurRad="38100" dist="38100" dir="2700000" algn="tl">
-                    <a:srgbClr val="000000">
-                      <a:alpha val="43137"/>
-                    </a:srgbClr>
-                  </a:outerShdw>
-                </a:effectLst>
-                <a:latin typeface="TH Baijam" panose="02000506000000020004" pitchFamily="2" charset="-34"/>
-                <a:cs typeface="TH Baijam" panose="02000506000000020004" pitchFamily="2" charset="-34"/>
-              </a:rPr>
-              <a:t>การบ้าน</a:t>
-            </a:r>
-          </a:p>
-        </p:txBody>
-      </p:sp>
-      <p:sp>
-        <p:nvSpPr>
-          <p:cNvPr id="3" name="ตัวแทนเนื้อหา 2">
-            <a:extLst>
-              <a:ext uri="{FF2B5EF4-FFF2-40B4-BE49-F238E27FC236}">
-                <a16:creationId xmlns:a16="http://schemas.microsoft.com/office/drawing/2014/main" id="{4E78994C-6D4D-4CC1-ABEE-DCC6ABD6F3CD}"/>
-              </a:ext>
-            </a:extLst>
-          </p:cNvPr>
-          <p:cNvSpPr>
-            <a:spLocks noGrp="1"/>
-          </p:cNvSpPr>
-          <p:nvPr>
-            <p:ph idx="1"/>
-          </p:nvPr>
-        </p:nvSpPr>
-        <p:spPr/>
-        <p:txBody>
-          <a:bodyPr/>
-          <a:lstStyle/>
-          <a:p>
-            <a:r>
-              <a:rPr lang="th-TH" dirty="0"/>
-              <a:t>ค้นคว้าและทำรายงาน ในกรณีต่อไปนี้</a:t>
-            </a:r>
-          </a:p>
-          <a:p>
-            <a:pPr marL="457200" lvl="1" indent="0">
-              <a:buNone/>
-            </a:pPr>
-            <a:endParaRPr lang="th-TH" dirty="0"/>
-          </a:p>
-          <a:p>
-            <a:pPr lvl="1"/>
-            <a:endParaRPr lang="th-TH" dirty="0"/>
-          </a:p>
-          <a:p>
-            <a:pPr lvl="1"/>
-            <a:endParaRPr lang="th-TH" dirty="0"/>
-          </a:p>
-        </p:txBody>
-      </p:sp>
-      <p:sp>
-        <p:nvSpPr>
-          <p:cNvPr id="4" name="ตัวแทนท้ายกระดาษ 3">
-            <a:extLst>
-              <a:ext uri="{FF2B5EF4-FFF2-40B4-BE49-F238E27FC236}">
-                <a16:creationId xmlns:a16="http://schemas.microsoft.com/office/drawing/2014/main" id="{9E0314FB-5068-4CBE-8C64-36CD6501B300}"/>
-              </a:ext>
-            </a:extLst>
-          </p:cNvPr>
-          <p:cNvSpPr>
-            <a:spLocks noGrp="1"/>
-          </p:cNvSpPr>
-          <p:nvPr>
-            <p:ph type="ftr" sz="quarter" idx="11"/>
-          </p:nvPr>
-        </p:nvSpPr>
-        <p:spPr/>
-        <p:txBody>
-          <a:bodyPr/>
-          <a:lstStyle/>
-          <a:p>
-            <a:r>
-              <a:rPr lang="th-TH"/>
-              <a:t>03376806 วิศวกรรมซอฟต์แวร์ </a:t>
-            </a:r>
-            <a:r>
-              <a:rPr lang="en-US"/>
-              <a:t>week 1</a:t>
-            </a:r>
-            <a:endParaRPr lang="th-TH"/>
-          </a:p>
-        </p:txBody>
-      </p:sp>
-      <p:sp>
-        <p:nvSpPr>
-          <p:cNvPr id="5" name="ตัวแทนหมายเลขสไลด์ 4">
-            <a:extLst>
-              <a:ext uri="{FF2B5EF4-FFF2-40B4-BE49-F238E27FC236}">
-                <a16:creationId xmlns:a16="http://schemas.microsoft.com/office/drawing/2014/main" id="{1004C506-3A38-4229-86BD-C40D5CDE08C4}"/>
-              </a:ext>
-            </a:extLst>
-          </p:cNvPr>
-          <p:cNvSpPr>
-            <a:spLocks noGrp="1"/>
-          </p:cNvSpPr>
-          <p:nvPr>
-            <p:ph type="sldNum" sz="quarter" idx="12"/>
-          </p:nvPr>
-        </p:nvSpPr>
-        <p:spPr/>
-        <p:txBody>
-          <a:bodyPr/>
-          <a:lstStyle/>
-          <a:p>
-            <a:fld id="{0C468570-60A3-4ADB-9380-76B48A372335}" type="slidenum">
-              <a:rPr lang="th-TH" smtClean="0"/>
-              <a:t>41</a:t>
-            </a:fld>
-            <a:endParaRPr lang="th-TH"/>
-          </a:p>
-        </p:txBody>
-      </p:sp>
-    </p:spTree>
-    <p:extLst>
-      <p:ext uri="{BB962C8B-B14F-4D97-AF65-F5344CB8AC3E}">
-        <p14:creationId xmlns:p14="http://schemas.microsoft.com/office/powerpoint/2010/main" val="2612993438"/>
       </p:ext>
     </p:extLst>
   </p:cSld>

</xml_diff>